<commit_message>
Actually the final push
</commit_message>
<xml_diff>
--- a/IEEE Python Workshop.pptx
+++ b/IEEE Python Workshop.pptx
@@ -11,10 +11,11 @@
     <p:sldId id="260" r:id="rId5"/>
     <p:sldId id="258" r:id="rId6"/>
     <p:sldId id="261" r:id="rId7"/>
-    <p:sldId id="262" r:id="rId8"/>
-    <p:sldId id="263" r:id="rId9"/>
-    <p:sldId id="264" r:id="rId10"/>
-    <p:sldId id="265" r:id="rId11"/>
+    <p:sldId id="266" r:id="rId8"/>
+    <p:sldId id="262" r:id="rId9"/>
+    <p:sldId id="263" r:id="rId10"/>
+    <p:sldId id="264" r:id="rId11"/>
+    <p:sldId id="265" r:id="rId12"/>
   </p:sldIdLst>
   <p:sldSz cx="12192000" cy="6858000"/>
   <p:notesSz cx="6858000" cy="9144000"/>
@@ -268,7 +269,7 @@
           <a:p>
             <a:fld id="{691CF7C4-D132-453A-B848-8125578FCBFB}" type="datetimeFigureOut">
               <a:rPr lang="en-US" smtClean="0"/>
-              <a:t>4/16/2021</a:t>
+              <a:t>4/23/2021</a:t>
             </a:fld>
             <a:endParaRPr lang="en-US"/>
           </a:p>
@@ -466,7 +467,7 @@
           <a:p>
             <a:fld id="{691CF7C4-D132-453A-B848-8125578FCBFB}" type="datetimeFigureOut">
               <a:rPr lang="en-US" smtClean="0"/>
-              <a:t>4/16/2021</a:t>
+              <a:t>4/23/2021</a:t>
             </a:fld>
             <a:endParaRPr lang="en-US"/>
           </a:p>
@@ -674,7 +675,7 @@
           <a:p>
             <a:fld id="{691CF7C4-D132-453A-B848-8125578FCBFB}" type="datetimeFigureOut">
               <a:rPr lang="en-US" smtClean="0"/>
-              <a:t>4/16/2021</a:t>
+              <a:t>4/23/2021</a:t>
             </a:fld>
             <a:endParaRPr lang="en-US"/>
           </a:p>
@@ -872,7 +873,7 @@
           <a:p>
             <a:fld id="{691CF7C4-D132-453A-B848-8125578FCBFB}" type="datetimeFigureOut">
               <a:rPr lang="en-US" smtClean="0"/>
-              <a:t>4/16/2021</a:t>
+              <a:t>4/23/2021</a:t>
             </a:fld>
             <a:endParaRPr lang="en-US"/>
           </a:p>
@@ -1147,7 +1148,7 @@
           <a:p>
             <a:fld id="{691CF7C4-D132-453A-B848-8125578FCBFB}" type="datetimeFigureOut">
               <a:rPr lang="en-US" smtClean="0"/>
-              <a:t>4/16/2021</a:t>
+              <a:t>4/23/2021</a:t>
             </a:fld>
             <a:endParaRPr lang="en-US"/>
           </a:p>
@@ -1412,7 +1413,7 @@
           <a:p>
             <a:fld id="{691CF7C4-D132-453A-B848-8125578FCBFB}" type="datetimeFigureOut">
               <a:rPr lang="en-US" smtClean="0"/>
-              <a:t>4/16/2021</a:t>
+              <a:t>4/23/2021</a:t>
             </a:fld>
             <a:endParaRPr lang="en-US"/>
           </a:p>
@@ -1824,7 +1825,7 @@
           <a:p>
             <a:fld id="{691CF7C4-D132-453A-B848-8125578FCBFB}" type="datetimeFigureOut">
               <a:rPr lang="en-US" smtClean="0"/>
-              <a:t>4/16/2021</a:t>
+              <a:t>4/23/2021</a:t>
             </a:fld>
             <a:endParaRPr lang="en-US"/>
           </a:p>
@@ -1965,7 +1966,7 @@
           <a:p>
             <a:fld id="{691CF7C4-D132-453A-B848-8125578FCBFB}" type="datetimeFigureOut">
               <a:rPr lang="en-US" smtClean="0"/>
-              <a:t>4/16/2021</a:t>
+              <a:t>4/23/2021</a:t>
             </a:fld>
             <a:endParaRPr lang="en-US"/>
           </a:p>
@@ -2078,7 +2079,7 @@
           <a:p>
             <a:fld id="{691CF7C4-D132-453A-B848-8125578FCBFB}" type="datetimeFigureOut">
               <a:rPr lang="en-US" smtClean="0"/>
-              <a:t>4/16/2021</a:t>
+              <a:t>4/23/2021</a:t>
             </a:fld>
             <a:endParaRPr lang="en-US"/>
           </a:p>
@@ -2389,7 +2390,7 @@
           <a:p>
             <a:fld id="{691CF7C4-D132-453A-B848-8125578FCBFB}" type="datetimeFigureOut">
               <a:rPr lang="en-US" smtClean="0"/>
-              <a:t>4/16/2021</a:t>
+              <a:t>4/23/2021</a:t>
             </a:fld>
             <a:endParaRPr lang="en-US"/>
           </a:p>
@@ -2677,7 +2678,7 @@
           <a:p>
             <a:fld id="{691CF7C4-D132-453A-B848-8125578FCBFB}" type="datetimeFigureOut">
               <a:rPr lang="en-US" smtClean="0"/>
-              <a:t>4/16/2021</a:t>
+              <a:t>4/23/2021</a:t>
             </a:fld>
             <a:endParaRPr lang="en-US"/>
           </a:p>
@@ -2918,7 +2919,7 @@
           <a:p>
             <a:fld id="{691CF7C4-D132-453A-B848-8125578FCBFB}" type="datetimeFigureOut">
               <a:rPr lang="en-US" smtClean="0"/>
-              <a:t>4/16/2021</a:t>
+              <a:t>4/23/2021</a:t>
             </a:fld>
             <a:endParaRPr lang="en-US"/>
           </a:p>
@@ -3426,6 +3427,113 @@
           <p:cNvPr id="2" name="Title 1">
             <a:extLst>
               <a:ext uri="{FF2B5EF4-FFF2-40B4-BE49-F238E27FC236}">
+                <a16:creationId xmlns:a16="http://schemas.microsoft.com/office/drawing/2014/main" id="{A157B6B1-20F2-4846-8D21-A357B639FEE3}"/>
+              </a:ext>
+            </a:extLst>
+          </p:cNvPr>
+          <p:cNvSpPr>
+            <a:spLocks noGrp="1"/>
+          </p:cNvSpPr>
+          <p:nvPr>
+            <p:ph type="title"/>
+          </p:nvPr>
+        </p:nvSpPr>
+        <p:spPr/>
+        <p:txBody>
+          <a:bodyPr/>
+          <a:lstStyle/>
+          <a:p>
+            <a:r>
+              <a:rPr lang="en-US" dirty="0"/>
+              <a:t>PCB Workshop</a:t>
+            </a:r>
+          </a:p>
+        </p:txBody>
+      </p:sp>
+      <p:sp>
+        <p:nvSpPr>
+          <p:cNvPr id="3" name="Content Placeholder 2">
+            <a:extLst>
+              <a:ext uri="{FF2B5EF4-FFF2-40B4-BE49-F238E27FC236}">
+                <a16:creationId xmlns:a16="http://schemas.microsoft.com/office/drawing/2014/main" id="{DAEFC846-E2BD-4F1D-B67E-F2EEEE746CD8}"/>
+              </a:ext>
+            </a:extLst>
+          </p:cNvPr>
+          <p:cNvSpPr>
+            <a:spLocks noGrp="1"/>
+          </p:cNvSpPr>
+          <p:nvPr>
+            <p:ph idx="1"/>
+          </p:nvPr>
+        </p:nvSpPr>
+        <p:spPr/>
+        <p:txBody>
+          <a:bodyPr/>
+          <a:lstStyle/>
+          <a:p>
+            <a:r>
+              <a:rPr lang="en-US" dirty="0"/>
+              <a:t>An IEEE classic: Learn to use </a:t>
+            </a:r>
+            <a:r>
+              <a:rPr lang="en-US" dirty="0" err="1"/>
+              <a:t>KiCAD</a:t>
+            </a:r>
+            <a:r>
+              <a:rPr lang="en-US" dirty="0"/>
+              <a:t> to design your PCB</a:t>
+            </a:r>
+          </a:p>
+          <a:p>
+            <a:r>
+              <a:rPr lang="en-US" dirty="0"/>
+              <a:t>Can convert projects on solderless breadboard to a much neater, cooler custom PCB</a:t>
+            </a:r>
+          </a:p>
+          <a:p>
+            <a:pPr lvl="1"/>
+            <a:r>
+              <a:rPr lang="en-US" dirty="0"/>
+              <a:t>Good for showing off at interviews</a:t>
+            </a:r>
+          </a:p>
+        </p:txBody>
+      </p:sp>
+    </p:spTree>
+    <p:extLst>
+      <p:ext uri="{BB962C8B-B14F-4D97-AF65-F5344CB8AC3E}">
+        <p14:creationId xmlns:p14="http://schemas.microsoft.com/office/powerpoint/2010/main" val="3999561838"/>
+      </p:ext>
+    </p:extLst>
+  </p:cSld>
+  <p:clrMapOvr>
+    <a:masterClrMapping/>
+  </p:clrMapOvr>
+</p:sld>
+</file>
+
+<file path=ppt/slides/slide11.xml><?xml version="1.0" encoding="utf-8"?>
+<p:sld xmlns:a="http://schemas.openxmlformats.org/drawingml/2006/main" xmlns:r="http://schemas.openxmlformats.org/officeDocument/2006/relationships" xmlns:p="http://schemas.openxmlformats.org/presentationml/2006/main">
+  <p:cSld>
+    <p:spTree>
+      <p:nvGrpSpPr>
+        <p:cNvPr id="1" name=""/>
+        <p:cNvGrpSpPr/>
+        <p:nvPr/>
+      </p:nvGrpSpPr>
+      <p:grpSpPr>
+        <a:xfrm>
+          <a:off x="0" y="0"/>
+          <a:ext cx="0" cy="0"/>
+          <a:chOff x="0" y="0"/>
+          <a:chExt cx="0" cy="0"/>
+        </a:xfrm>
+      </p:grpSpPr>
+      <p:sp>
+        <p:nvSpPr>
+          <p:cNvPr id="2" name="Title 1">
+            <a:extLst>
+              <a:ext uri="{FF2B5EF4-FFF2-40B4-BE49-F238E27FC236}">
                 <a16:creationId xmlns:a16="http://schemas.microsoft.com/office/drawing/2014/main" id="{6A1C786A-1697-4683-9D61-A88D0CF3EE6A}"/>
               </a:ext>
             </a:extLst>
@@ -3480,6 +3588,33 @@
             <a:r>
               <a:rPr lang="en-US" dirty="0"/>
               <a:t>(you provide the ice cream for yourself unfortunately)</a:t>
+            </a:r>
+          </a:p>
+          <a:p>
+            <a:r>
+              <a:rPr lang="en-US" dirty="0"/>
+              <a:t>Or any other type of social</a:t>
+            </a:r>
+          </a:p>
+          <a:p>
+            <a:pPr lvl="1"/>
+            <a:r>
+              <a:rPr lang="en-US" dirty="0"/>
+              <a:t>Among us</a:t>
+            </a:r>
+          </a:p>
+          <a:p>
+            <a:pPr lvl="1"/>
+            <a:r>
+              <a:rPr lang="en-US" dirty="0"/>
+              <a:t>Movie night</a:t>
+            </a:r>
+          </a:p>
+          <a:p>
+            <a:pPr lvl="1"/>
+            <a:r>
+              <a:rPr lang="en-US" dirty="0"/>
+              <a:t>Etc.</a:t>
             </a:r>
           </a:p>
         </p:txBody>
@@ -3667,6 +3802,12 @@
               <a:t>The superfast Python Intro</a:t>
             </a:r>
           </a:p>
+          <a:p>
+            <a:r>
+              <a:rPr lang="en-US" dirty="0"/>
+              <a:t>https://colab.research.google.com/drive/1FZuA1N19z2-xT6wfhEzVRgXIwyFi-VJ_?usp=sharing</a:t>
+            </a:r>
+          </a:p>
         </p:txBody>
       </p:sp>
     </p:spTree>
@@ -3751,6 +3892,12 @@
             <a:r>
               <a:rPr lang="en-US" dirty="0"/>
               <a:t>What are we coding?</a:t>
+            </a:r>
+          </a:p>
+          <a:p>
+            <a:r>
+              <a:rPr lang="en-US" dirty="0"/>
+              <a:t>https://colab.research.google.com/drive/1SW3-krotbXJKfcejoYD3OCpK_Mn2YIXJ?usp=sharing</a:t>
             </a:r>
           </a:p>
         </p:txBody>
@@ -4039,53 +4186,98 @@
           <p:cNvPr id="2" name="Title 1">
             <a:extLst>
               <a:ext uri="{FF2B5EF4-FFF2-40B4-BE49-F238E27FC236}">
-                <a16:creationId xmlns:a16="http://schemas.microsoft.com/office/drawing/2014/main" id="{58E61A49-94B8-4798-BEB3-9CF239842794}"/>
-              </a:ext>
-            </a:extLst>
-          </p:cNvPr>
-          <p:cNvSpPr>
-            <a:spLocks noGrp="1"/>
-          </p:cNvSpPr>
-          <p:nvPr>
-            <p:ph type="ctrTitle"/>
-          </p:nvPr>
-        </p:nvSpPr>
-        <p:spPr/>
-        <p:txBody>
-          <a:bodyPr/>
-          <a:lstStyle/>
-          <a:p>
-            <a:r>
-              <a:rPr lang="en-US" dirty="0"/>
-              <a:t>Week 9 Workshop</a:t>
-            </a:r>
-          </a:p>
-        </p:txBody>
-      </p:sp>
-      <p:sp>
-        <p:nvSpPr>
-          <p:cNvPr id="3" name="Subtitle 2">
-            <a:extLst>
-              <a:ext uri="{FF2B5EF4-FFF2-40B4-BE49-F238E27FC236}">
-                <a16:creationId xmlns:a16="http://schemas.microsoft.com/office/drawing/2014/main" id="{13BFCA5E-8F30-4B01-85D8-620395E196C7}"/>
-              </a:ext>
-            </a:extLst>
-          </p:cNvPr>
-          <p:cNvSpPr>
-            <a:spLocks noGrp="1"/>
-          </p:cNvSpPr>
-          <p:nvPr>
-            <p:ph type="subTitle" idx="1"/>
-          </p:nvPr>
-        </p:nvSpPr>
-        <p:spPr/>
-        <p:txBody>
-          <a:bodyPr/>
-          <a:lstStyle/>
-          <a:p>
-            <a:r>
-              <a:rPr lang="en-US" dirty="0"/>
-              <a:t>Time to vote!</a:t>
+                <a16:creationId xmlns:a16="http://schemas.microsoft.com/office/drawing/2014/main" id="{FE2B4B1B-BDBF-40CE-9059-4DBE2E9E29F3}"/>
+              </a:ext>
+            </a:extLst>
+          </p:cNvPr>
+          <p:cNvSpPr>
+            <a:spLocks noGrp="1"/>
+          </p:cNvSpPr>
+          <p:nvPr>
+            <p:ph type="title"/>
+          </p:nvPr>
+        </p:nvSpPr>
+        <p:spPr/>
+        <p:txBody>
+          <a:bodyPr/>
+          <a:lstStyle/>
+          <a:p>
+            <a:r>
+              <a:rPr lang="en-US" dirty="0"/>
+              <a:t>More Python Topics To Look into </a:t>
+            </a:r>
+          </a:p>
+        </p:txBody>
+      </p:sp>
+      <p:sp>
+        <p:nvSpPr>
+          <p:cNvPr id="3" name="Content Placeholder 2">
+            <a:extLst>
+              <a:ext uri="{FF2B5EF4-FFF2-40B4-BE49-F238E27FC236}">
+                <a16:creationId xmlns:a16="http://schemas.microsoft.com/office/drawing/2014/main" id="{B694D62C-10D4-48FB-B0ED-E0412A018627}"/>
+              </a:ext>
+            </a:extLst>
+          </p:cNvPr>
+          <p:cNvSpPr>
+            <a:spLocks noGrp="1"/>
+          </p:cNvSpPr>
+          <p:nvPr>
+            <p:ph idx="1"/>
+          </p:nvPr>
+        </p:nvSpPr>
+        <p:spPr/>
+        <p:txBody>
+          <a:bodyPr/>
+          <a:lstStyle/>
+          <a:p>
+            <a:r>
+              <a:rPr lang="en-US" dirty="0"/>
+              <a:t>Libraries</a:t>
+            </a:r>
+          </a:p>
+          <a:p>
+            <a:pPr lvl="1"/>
+            <a:r>
+              <a:rPr lang="en-US" dirty="0"/>
+              <a:t>Matplotlib – for graphing</a:t>
+            </a:r>
+          </a:p>
+          <a:p>
+            <a:pPr lvl="1"/>
+            <a:r>
+              <a:rPr lang="en-US" dirty="0" err="1"/>
+              <a:t>Numpy</a:t>
+            </a:r>
+            <a:r>
+              <a:rPr lang="en-US" dirty="0"/>
+              <a:t> – for matrices</a:t>
+            </a:r>
+          </a:p>
+          <a:p>
+            <a:pPr lvl="1"/>
+            <a:r>
+              <a:rPr lang="en-US" dirty="0"/>
+              <a:t>Pandas – for data analysis</a:t>
+            </a:r>
+          </a:p>
+          <a:p>
+            <a:r>
+              <a:rPr lang="en-US" dirty="0"/>
+              <a:t>Interesting Python stuff</a:t>
+            </a:r>
+          </a:p>
+          <a:p>
+            <a:pPr lvl="1"/>
+            <a:r>
+              <a:rPr lang="en-US" dirty="0"/>
+              <a:t>List/dictionary comprehensions</a:t>
+            </a:r>
+          </a:p>
+          <a:p>
+            <a:pPr lvl="1"/>
+            <a:r>
+              <a:rPr lang="en-US" dirty="0"/>
+              <a:t>generators</a:t>
             </a:r>
           </a:p>
         </p:txBody>
@@ -4093,7 +4285,7 @@
     </p:spTree>
     <p:extLst>
       <p:ext uri="{BB962C8B-B14F-4D97-AF65-F5344CB8AC3E}">
-        <p14:creationId xmlns:p14="http://schemas.microsoft.com/office/powerpoint/2010/main" val="831188471"/>
+        <p14:creationId xmlns:p14="http://schemas.microsoft.com/office/powerpoint/2010/main" val="712388491"/>
       </p:ext>
     </p:extLst>
   </p:cSld>
@@ -4125,90 +4317,53 @@
           <p:cNvPr id="2" name="Title 1">
             <a:extLst>
               <a:ext uri="{FF2B5EF4-FFF2-40B4-BE49-F238E27FC236}">
-                <a16:creationId xmlns:a16="http://schemas.microsoft.com/office/drawing/2014/main" id="{5C4F05BA-C603-433A-8ECB-7B518FB0FFD4}"/>
-              </a:ext>
-            </a:extLst>
-          </p:cNvPr>
-          <p:cNvSpPr>
-            <a:spLocks noGrp="1"/>
-          </p:cNvSpPr>
-          <p:nvPr>
-            <p:ph type="title"/>
-          </p:nvPr>
-        </p:nvSpPr>
-        <p:spPr/>
-        <p:txBody>
-          <a:bodyPr/>
-          <a:lstStyle/>
-          <a:p>
-            <a:r>
-              <a:rPr lang="en-US" dirty="0"/>
-              <a:t>Linux Dotfiles</a:t>
-            </a:r>
-          </a:p>
-        </p:txBody>
-      </p:sp>
-      <p:sp>
-        <p:nvSpPr>
-          <p:cNvPr id="3" name="Content Placeholder 2">
-            <a:extLst>
-              <a:ext uri="{FF2B5EF4-FFF2-40B4-BE49-F238E27FC236}">
-                <a16:creationId xmlns:a16="http://schemas.microsoft.com/office/drawing/2014/main" id="{EF20F78F-68A4-4292-84A7-E4B0CA243133}"/>
-              </a:ext>
-            </a:extLst>
-          </p:cNvPr>
-          <p:cNvSpPr>
-            <a:spLocks noGrp="1"/>
-          </p:cNvSpPr>
-          <p:nvPr>
-            <p:ph idx="1"/>
-          </p:nvPr>
-        </p:nvSpPr>
-        <p:spPr/>
-        <p:txBody>
-          <a:bodyPr/>
-          <a:lstStyle/>
-          <a:p>
-            <a:r>
-              <a:rPr lang="en-US" dirty="0"/>
-              <a:t>Want to customize your Linux setup? Learn how to change your Linux prompt, make line numbers appear automatically in Vim, and rebind annoying combinations for </a:t>
-            </a:r>
-            <a:r>
-              <a:rPr lang="en-US" dirty="0" err="1"/>
-              <a:t>tmux</a:t>
-            </a:r>
-            <a:r>
-              <a:rPr lang="en-US" dirty="0"/>
-              <a:t>!</a:t>
-            </a:r>
-          </a:p>
-          <a:p>
-            <a:r>
-              <a:rPr lang="en-US" dirty="0"/>
-              <a:t>Put all of this in a </a:t>
-            </a:r>
-            <a:r>
-              <a:rPr lang="en-US" dirty="0" err="1"/>
-              <a:t>github</a:t>
-            </a:r>
-            <a:r>
-              <a:rPr lang="en-US" dirty="0"/>
-              <a:t> repo with a script to automatically </a:t>
-            </a:r>
-            <a:r>
-              <a:rPr lang="en-US" dirty="0" err="1"/>
-              <a:t>simlink</a:t>
-            </a:r>
-            <a:r>
-              <a:rPr lang="en-US" dirty="0"/>
-              <a:t> all of this for you</a:t>
-            </a:r>
-          </a:p>
-          <a:p>
-            <a:pPr lvl="1"/>
-            <a:r>
-              <a:rPr lang="en-US" dirty="0"/>
-              <a:t>Can pull this down and install in every new environment</a:t>
+                <a16:creationId xmlns:a16="http://schemas.microsoft.com/office/drawing/2014/main" id="{58E61A49-94B8-4798-BEB3-9CF239842794}"/>
+              </a:ext>
+            </a:extLst>
+          </p:cNvPr>
+          <p:cNvSpPr>
+            <a:spLocks noGrp="1"/>
+          </p:cNvSpPr>
+          <p:nvPr>
+            <p:ph type="ctrTitle"/>
+          </p:nvPr>
+        </p:nvSpPr>
+        <p:spPr/>
+        <p:txBody>
+          <a:bodyPr/>
+          <a:lstStyle/>
+          <a:p>
+            <a:r>
+              <a:rPr lang="en-US" dirty="0"/>
+              <a:t>Week 9 Workshop</a:t>
+            </a:r>
+          </a:p>
+        </p:txBody>
+      </p:sp>
+      <p:sp>
+        <p:nvSpPr>
+          <p:cNvPr id="3" name="Subtitle 2">
+            <a:extLst>
+              <a:ext uri="{FF2B5EF4-FFF2-40B4-BE49-F238E27FC236}">
+                <a16:creationId xmlns:a16="http://schemas.microsoft.com/office/drawing/2014/main" id="{13BFCA5E-8F30-4B01-85D8-620395E196C7}"/>
+              </a:ext>
+            </a:extLst>
+          </p:cNvPr>
+          <p:cNvSpPr>
+            <a:spLocks noGrp="1"/>
+          </p:cNvSpPr>
+          <p:nvPr>
+            <p:ph type="subTitle" idx="1"/>
+          </p:nvPr>
+        </p:nvSpPr>
+        <p:spPr/>
+        <p:txBody>
+          <a:bodyPr/>
+          <a:lstStyle/>
+          <a:p>
+            <a:r>
+              <a:rPr lang="en-US" dirty="0"/>
+              <a:t>Time to vote!</a:t>
             </a:r>
           </a:p>
         </p:txBody>
@@ -4216,7 +4371,7 @@
     </p:spTree>
     <p:extLst>
       <p:ext uri="{BB962C8B-B14F-4D97-AF65-F5344CB8AC3E}">
-        <p14:creationId xmlns:p14="http://schemas.microsoft.com/office/powerpoint/2010/main" val="3364514094"/>
+        <p14:creationId xmlns:p14="http://schemas.microsoft.com/office/powerpoint/2010/main" val="831188471"/>
       </p:ext>
     </p:extLst>
   </p:cSld>
@@ -4248,7 +4403,7 @@
           <p:cNvPr id="2" name="Title 1">
             <a:extLst>
               <a:ext uri="{FF2B5EF4-FFF2-40B4-BE49-F238E27FC236}">
-                <a16:creationId xmlns:a16="http://schemas.microsoft.com/office/drawing/2014/main" id="{A157B6B1-20F2-4846-8D21-A357B639FEE3}"/>
+                <a16:creationId xmlns:a16="http://schemas.microsoft.com/office/drawing/2014/main" id="{5C4F05BA-C603-433A-8ECB-7B518FB0FFD4}"/>
               </a:ext>
             </a:extLst>
           </p:cNvPr>
@@ -4266,7 +4421,7 @@
           <a:p>
             <a:r>
               <a:rPr lang="en-US" dirty="0"/>
-              <a:t>PCB Workshop</a:t>
+              <a:t>Linux Dotfiles</a:t>
             </a:r>
           </a:p>
         </p:txBody>
@@ -4276,7 +4431,7 @@
           <p:cNvPr id="3" name="Content Placeholder 2">
             <a:extLst>
               <a:ext uri="{FF2B5EF4-FFF2-40B4-BE49-F238E27FC236}">
-                <a16:creationId xmlns:a16="http://schemas.microsoft.com/office/drawing/2014/main" id="{DAEFC846-E2BD-4F1D-B67E-F2EEEE746CD8}"/>
+                <a16:creationId xmlns:a16="http://schemas.microsoft.com/office/drawing/2014/main" id="{EF20F78F-68A4-4292-84A7-E4B0CA243133}"/>
               </a:ext>
             </a:extLst>
           </p:cNvPr>
@@ -4294,15 +4449,44 @@
           <a:p>
             <a:r>
               <a:rPr lang="en-US" dirty="0"/>
-              <a:t>An IEEE classic: Learn to use </a:t>
+              <a:t>Want to customize your Linux setup? Learn how to change your Linux prompt, make line numbers appear automatically in Vim, and rebind annoying combinations for </a:t>
             </a:r>
             <a:r>
               <a:rPr lang="en-US" dirty="0" err="1"/>
-              <a:t>KiCAD</a:t>
-            </a:r>
-            <a:r>
-              <a:rPr lang="en-US" dirty="0"/>
-              <a:t> to design your PCB</a:t>
+              <a:t>tmux</a:t>
+            </a:r>
+            <a:r>
+              <a:rPr lang="en-US" dirty="0"/>
+              <a:t>!</a:t>
+            </a:r>
+          </a:p>
+          <a:p>
+            <a:r>
+              <a:rPr lang="en-US" dirty="0"/>
+              <a:t>Put all of this in a </a:t>
+            </a:r>
+            <a:r>
+              <a:rPr lang="en-US" dirty="0" err="1"/>
+              <a:t>github</a:t>
+            </a:r>
+            <a:r>
+              <a:rPr lang="en-US" dirty="0"/>
+              <a:t> repo with a script to automatically </a:t>
+            </a:r>
+            <a:r>
+              <a:rPr lang="en-US" dirty="0" err="1"/>
+              <a:t>simlink</a:t>
+            </a:r>
+            <a:r>
+              <a:rPr lang="en-US" dirty="0"/>
+              <a:t> all of this for you</a:t>
+            </a:r>
+          </a:p>
+          <a:p>
+            <a:pPr lvl="1"/>
+            <a:r>
+              <a:rPr lang="en-US" dirty="0"/>
+              <a:t>Can pull this down and install in every new environment</a:t>
             </a:r>
           </a:p>
         </p:txBody>
@@ -4310,7 +4494,7 @@
     </p:spTree>
     <p:extLst>
       <p:ext uri="{BB962C8B-B14F-4D97-AF65-F5344CB8AC3E}">
-        <p14:creationId xmlns:p14="http://schemas.microsoft.com/office/powerpoint/2010/main" val="3999561838"/>
+        <p14:creationId xmlns:p14="http://schemas.microsoft.com/office/powerpoint/2010/main" val="3364514094"/>
       </p:ext>
     </p:extLst>
   </p:cSld>

</xml_diff>